<commit_message>
worked on the JUM presentations,
</commit_message>
<xml_diff>
--- a/project_files/presentations/multiomic_rnaseq_psi_results_presentation_part3.pptx
+++ b/project_files/presentations/multiomic_rnaseq_psi_results_presentation_part3.pptx
@@ -13,6 +13,7 @@
     <p:sldId id="283" r:id="rId7"/>
     <p:sldId id="285" r:id="rId8"/>
     <p:sldId id="286" r:id="rId9"/>
+    <p:sldId id="289" r:id="rId10"/>
   </p:sldIdLst>
   <p:sldSz cx="12192000" cy="6858000"/>
   <p:notesSz cx="6858000" cy="9144000"/>
@@ -278,7 +279,7 @@
           <a:p>
             <a:fld id="{C2A7D3C6-B661-42D3-9911-8182F647D9FF}" type="datetimeFigureOut">
               <a:rPr lang="en-US" smtClean="0"/>
-              <a:t>14-Apr-20</a:t>
+              <a:t>17-Apr-20</a:t>
             </a:fld>
             <a:endParaRPr lang="en-US"/>
           </a:p>
@@ -476,7 +477,7 @@
           <a:p>
             <a:fld id="{C2A7D3C6-B661-42D3-9911-8182F647D9FF}" type="datetimeFigureOut">
               <a:rPr lang="en-US" smtClean="0"/>
-              <a:t>14-Apr-20</a:t>
+              <a:t>17-Apr-20</a:t>
             </a:fld>
             <a:endParaRPr lang="en-US"/>
           </a:p>
@@ -684,7 +685,7 @@
           <a:p>
             <a:fld id="{C2A7D3C6-B661-42D3-9911-8182F647D9FF}" type="datetimeFigureOut">
               <a:rPr lang="en-US" smtClean="0"/>
-              <a:t>14-Apr-20</a:t>
+              <a:t>17-Apr-20</a:t>
             </a:fld>
             <a:endParaRPr lang="en-US"/>
           </a:p>
@@ -882,7 +883,7 @@
           <a:p>
             <a:fld id="{C2A7D3C6-B661-42D3-9911-8182F647D9FF}" type="datetimeFigureOut">
               <a:rPr lang="en-US" smtClean="0"/>
-              <a:t>14-Apr-20</a:t>
+              <a:t>17-Apr-20</a:t>
             </a:fld>
             <a:endParaRPr lang="en-US"/>
           </a:p>
@@ -1157,7 +1158,7 @@
           <a:p>
             <a:fld id="{C2A7D3C6-B661-42D3-9911-8182F647D9FF}" type="datetimeFigureOut">
               <a:rPr lang="en-US" smtClean="0"/>
-              <a:t>14-Apr-20</a:t>
+              <a:t>17-Apr-20</a:t>
             </a:fld>
             <a:endParaRPr lang="en-US"/>
           </a:p>
@@ -1422,7 +1423,7 @@
           <a:p>
             <a:fld id="{C2A7D3C6-B661-42D3-9911-8182F647D9FF}" type="datetimeFigureOut">
               <a:rPr lang="en-US" smtClean="0"/>
-              <a:t>14-Apr-20</a:t>
+              <a:t>17-Apr-20</a:t>
             </a:fld>
             <a:endParaRPr lang="en-US"/>
           </a:p>
@@ -1834,7 +1835,7 @@
           <a:p>
             <a:fld id="{C2A7D3C6-B661-42D3-9911-8182F647D9FF}" type="datetimeFigureOut">
               <a:rPr lang="en-US" smtClean="0"/>
-              <a:t>14-Apr-20</a:t>
+              <a:t>17-Apr-20</a:t>
             </a:fld>
             <a:endParaRPr lang="en-US"/>
           </a:p>
@@ -1975,7 +1976,7 @@
           <a:p>
             <a:fld id="{C2A7D3C6-B661-42D3-9911-8182F647D9FF}" type="datetimeFigureOut">
               <a:rPr lang="en-US" smtClean="0"/>
-              <a:t>14-Apr-20</a:t>
+              <a:t>17-Apr-20</a:t>
             </a:fld>
             <a:endParaRPr lang="en-US"/>
           </a:p>
@@ -2088,7 +2089,7 @@
           <a:p>
             <a:fld id="{C2A7D3C6-B661-42D3-9911-8182F647D9FF}" type="datetimeFigureOut">
               <a:rPr lang="en-US" smtClean="0"/>
-              <a:t>14-Apr-20</a:t>
+              <a:t>17-Apr-20</a:t>
             </a:fld>
             <a:endParaRPr lang="en-US"/>
           </a:p>
@@ -2399,7 +2400,7 @@
           <a:p>
             <a:fld id="{C2A7D3C6-B661-42D3-9911-8182F647D9FF}" type="datetimeFigureOut">
               <a:rPr lang="en-US" smtClean="0"/>
-              <a:t>14-Apr-20</a:t>
+              <a:t>17-Apr-20</a:t>
             </a:fld>
             <a:endParaRPr lang="en-US"/>
           </a:p>
@@ -2687,7 +2688,7 @@
           <a:p>
             <a:fld id="{C2A7D3C6-B661-42D3-9911-8182F647D9FF}" type="datetimeFigureOut">
               <a:rPr lang="en-US" smtClean="0"/>
-              <a:t>14-Apr-20</a:t>
+              <a:t>17-Apr-20</a:t>
             </a:fld>
             <a:endParaRPr lang="en-US"/>
           </a:p>
@@ -2928,7 +2929,7 @@
           <a:p>
             <a:fld id="{C2A7D3C6-B661-42D3-9911-8182F647D9FF}" type="datetimeFigureOut">
               <a:rPr lang="en-US" smtClean="0"/>
-              <a:t>14-Apr-20</a:t>
+              <a:t>17-Apr-20</a:t>
             </a:fld>
             <a:endParaRPr lang="en-US"/>
           </a:p>
@@ -5877,7 +5878,7 @@
           <a:p>
             <a:r>
               <a:rPr lang="en-US" dirty="0"/>
-              <a:t>Validation of expression analyses</a:t>
+              <a:t>RNA-Seq expression analyses</a:t>
             </a:r>
           </a:p>
         </p:txBody>
@@ -5951,7 +5952,7 @@
                 </a:r>
                 <a:r>
                   <a:rPr lang="en-US" sz="2000" dirty="0"/>
-                  <a:t> done using </a:t>
+                  <a:t> done using RUV/</a:t>
                 </a:r>
                 <a:r>
                   <a:rPr lang="en-US" sz="2000" dirty="0" err="1"/>
@@ -5980,8 +5981,8 @@
                     <m:func>
                       <m:funcPr>
                         <m:ctrlPr>
-                          <a:rPr lang="en-US" sz="2000" b="0" smtClean="0">
-                            <a:latin typeface="XITS Math" panose="02000503000000000000" pitchFamily="50" charset="0"/>
+                          <a:rPr lang="en-US" sz="2000" b="0" i="1" smtClean="0">
+                            <a:latin typeface="Cambria Math" panose="02040503050406030204" pitchFamily="18" charset="0"/>
                             <a:ea typeface="XITS Math" panose="02000503000000000000" pitchFamily="50" charset="0"/>
                             <a:cs typeface="XITS Math" panose="02000503000000000000" pitchFamily="50" charset="0"/>
                           </a:rPr>
@@ -5991,8 +5992,8 @@
                         <m:sSub>
                           <m:sSubPr>
                             <m:ctrlPr>
-                              <a:rPr lang="en-US" sz="2000" b="0" smtClean="0">
-                                <a:latin typeface="XITS Math" panose="02000503000000000000" pitchFamily="50" charset="0"/>
+                              <a:rPr lang="en-US" sz="2000" b="0" i="1" smtClean="0">
+                                <a:latin typeface="Cambria Math" panose="02040503050406030204" pitchFamily="18" charset="0"/>
                                 <a:ea typeface="XITS Math" panose="02000503000000000000" pitchFamily="50" charset="0"/>
                                 <a:cs typeface="XITS Math" panose="02000503000000000000" pitchFamily="50" charset="0"/>
                               </a:rPr>
@@ -6057,11 +6058,7 @@
                 </a:r>
                 <a:r>
                   <a:rPr lang="en-US" sz="2000" dirty="0"/>
-                  <a:t>any </a:t>
-                </a:r>
-                <a:r>
-                  <a:rPr lang="en-US" sz="2000"/>
-                  <a:t>two timepoints</a:t>
+                  <a:t>any two timepoints</a:t>
                 </a:r>
                 <a:endParaRPr lang="en-US" sz="2000" dirty="0">
                   <a:latin typeface="XITS Math" panose="02000503000000000000" pitchFamily="50" charset="0"/>
@@ -6800,7 +6797,7 @@
         </p:nvSpPr>
         <p:spPr>
           <a:xfrm>
-            <a:off x="838200" y="449580"/>
+            <a:off x="838200" y="526770"/>
             <a:ext cx="10515600" cy="604788"/>
           </a:xfrm>
         </p:spPr>
@@ -7027,6 +7024,1067 @@
       </p:grpSpPr>
       <p:pic>
         <p:nvPicPr>
+          <p:cNvPr id="11" name="Picture 10">
+            <a:extLst>
+              <a:ext uri="{FF2B5EF4-FFF2-40B4-BE49-F238E27FC236}">
+                <a16:creationId xmlns:a16="http://schemas.microsoft.com/office/drawing/2014/main" id="{48DA95FD-5CC8-4146-A014-5DBE99AFEDEF}"/>
+              </a:ext>
+            </a:extLst>
+          </p:cNvPr>
+          <p:cNvPicPr>
+            <a:picLocks noChangeAspect="1"/>
+          </p:cNvPicPr>
+          <p:nvPr/>
+        </p:nvPicPr>
+        <p:blipFill>
+          <a:blip r:embed="rId2"/>
+          <a:stretch>
+            <a:fillRect/>
+          </a:stretch>
+        </p:blipFill>
+        <p:spPr>
+          <a:xfrm>
+            <a:off x="6096000" y="2954670"/>
+            <a:ext cx="2781702" cy="1784351"/>
+          </a:xfrm>
+          <a:prstGeom prst="rect">
+            <a:avLst/>
+          </a:prstGeom>
+        </p:spPr>
+      </p:pic>
+      <p:pic>
+        <p:nvPicPr>
+          <p:cNvPr id="8" name="Graphic 7">
+            <a:extLst>
+              <a:ext uri="{FF2B5EF4-FFF2-40B4-BE49-F238E27FC236}">
+                <a16:creationId xmlns:a16="http://schemas.microsoft.com/office/drawing/2014/main" id="{8EB94292-B462-4F46-961B-763B31BBFFB5}"/>
+              </a:ext>
+            </a:extLst>
+          </p:cNvPr>
+          <p:cNvPicPr>
+            <a:picLocks noChangeAspect="1"/>
+          </p:cNvPicPr>
+          <p:nvPr/>
+        </p:nvPicPr>
+        <p:blipFill>
+          <a:blip r:embed="rId3">
+            <a:extLst>
+              <a:ext uri="{96DAC541-7B7A-43D3-8B79-37D633B846F1}">
+                <asvg:svgBlip xmlns:asvg="http://schemas.microsoft.com/office/drawing/2016/SVG/main" r:embed="rId4"/>
+              </a:ext>
+            </a:extLst>
+          </a:blip>
+          <a:stretch>
+            <a:fillRect/>
+          </a:stretch>
+        </p:blipFill>
+        <p:spPr>
+          <a:xfrm>
+            <a:off x="6500793" y="1160947"/>
+            <a:ext cx="2356728" cy="1273175"/>
+          </a:xfrm>
+          <a:prstGeom prst="rect">
+            <a:avLst/>
+          </a:prstGeom>
+        </p:spPr>
+      </p:pic>
+      <p:sp>
+        <p:nvSpPr>
+          <p:cNvPr id="17" name="Rectangle 16">
+            <a:extLst>
+              <a:ext uri="{FF2B5EF4-FFF2-40B4-BE49-F238E27FC236}">
+                <a16:creationId xmlns:a16="http://schemas.microsoft.com/office/drawing/2014/main" id="{3DE61035-CAC2-4F9F-B645-BBABFECE8C11}"/>
+              </a:ext>
+            </a:extLst>
+          </p:cNvPr>
+          <p:cNvSpPr/>
+          <p:nvPr/>
+        </p:nvSpPr>
+        <p:spPr>
+          <a:xfrm>
+            <a:off x="6489743" y="992025"/>
+            <a:ext cx="2535062" cy="3794504"/>
+          </a:xfrm>
+          <a:prstGeom prst="rect">
+            <a:avLst/>
+          </a:prstGeom>
+          <a:solidFill>
+            <a:srgbClr val="D9D9D9">
+              <a:alpha val="21176"/>
+            </a:srgbClr>
+          </a:solidFill>
+          <a:ln>
+            <a:noFill/>
+          </a:ln>
+        </p:spPr>
+        <p:style>
+          <a:lnRef idx="2">
+            <a:schemeClr val="accent1">
+              <a:shade val="50000"/>
+            </a:schemeClr>
+          </a:lnRef>
+          <a:fillRef idx="1">
+            <a:schemeClr val="accent1"/>
+          </a:fillRef>
+          <a:effectRef idx="0">
+            <a:schemeClr val="accent1"/>
+          </a:effectRef>
+          <a:fontRef idx="minor">
+            <a:schemeClr val="lt1"/>
+          </a:fontRef>
+        </p:style>
+        <p:txBody>
+          <a:bodyPr rtlCol="0" anchor="ctr"/>
+          <a:lstStyle/>
+          <a:p>
+            <a:pPr algn="ctr"/>
+            <a:endParaRPr lang="en-US"/>
+          </a:p>
+        </p:txBody>
+      </p:sp>
+      <p:sp>
+        <p:nvSpPr>
+          <p:cNvPr id="2" name="Title 1">
+            <a:extLst>
+              <a:ext uri="{FF2B5EF4-FFF2-40B4-BE49-F238E27FC236}">
+                <a16:creationId xmlns:a16="http://schemas.microsoft.com/office/drawing/2014/main" id="{C8B609E5-FD82-4E0C-8881-7C9BF93C981C}"/>
+              </a:ext>
+            </a:extLst>
+          </p:cNvPr>
+          <p:cNvSpPr>
+            <a:spLocks noGrp="1"/>
+          </p:cNvSpPr>
+          <p:nvPr>
+            <p:ph type="title"/>
+          </p:nvPr>
+        </p:nvSpPr>
+        <p:spPr>
+          <a:xfrm>
+            <a:off x="838198" y="209843"/>
+            <a:ext cx="10775689" cy="604788"/>
+          </a:xfrm>
+        </p:spPr>
+        <p:txBody>
+          <a:bodyPr>
+            <a:normAutofit fontScale="90000"/>
+          </a:bodyPr>
+          <a:lstStyle/>
+          <a:p>
+            <a:r>
+              <a:rPr lang="en-US" dirty="0"/>
+              <a:t>Functional enrichment of PSI and expression – </a:t>
+            </a:r>
+            <a:r>
+              <a:rPr lang="en-US" dirty="0">
+                <a:solidFill>
+                  <a:srgbClr val="7030A0"/>
+                </a:solidFill>
+              </a:rPr>
+              <a:t>JUM</a:t>
+            </a:r>
+          </a:p>
+        </p:txBody>
+      </p:sp>
+      <p:sp>
+        <p:nvSpPr>
+          <p:cNvPr id="3" name="Content Placeholder 2">
+            <a:extLst>
+              <a:ext uri="{FF2B5EF4-FFF2-40B4-BE49-F238E27FC236}">
+                <a16:creationId xmlns:a16="http://schemas.microsoft.com/office/drawing/2014/main" id="{1C9BC676-F649-43A2-8760-630C36731FFB}"/>
+              </a:ext>
+            </a:extLst>
+          </p:cNvPr>
+          <p:cNvSpPr>
+            <a:spLocks noGrp="1"/>
+          </p:cNvSpPr>
+          <p:nvPr>
+            <p:ph idx="1"/>
+          </p:nvPr>
+        </p:nvSpPr>
+        <p:spPr>
+          <a:xfrm>
+            <a:off x="583242" y="992025"/>
+            <a:ext cx="5135880" cy="5656131"/>
+          </a:xfrm>
+        </p:spPr>
+        <p:txBody>
+          <a:bodyPr>
+            <a:noAutofit/>
+          </a:bodyPr>
+          <a:lstStyle/>
+          <a:p>
+            <a:r>
+              <a:rPr lang="en-US" sz="1800" dirty="0"/>
+              <a:t>For the PSI profiles, analyses were repeated:</a:t>
+            </a:r>
+          </a:p>
+          <a:p>
+            <a:pPr lvl="1">
+              <a:buFont typeface="Calibri" panose="020F0502020204030204" pitchFamily="34" charset="0"/>
+              <a:buChar char="−"/>
+            </a:pPr>
+            <a:r>
+              <a:rPr lang="en-US" sz="1800" dirty="0"/>
+              <a:t>GO Terms/cluster</a:t>
+            </a:r>
+          </a:p>
+          <a:p>
+            <a:pPr lvl="1">
+              <a:buFont typeface="Calibri" panose="020F0502020204030204" pitchFamily="34" charset="0"/>
+              <a:buChar char="−"/>
+            </a:pPr>
+            <a:r>
+              <a:rPr lang="en-US" sz="1800" dirty="0"/>
+              <a:t>PFAM families</a:t>
+            </a:r>
+          </a:p>
+          <a:p>
+            <a:pPr lvl="1">
+              <a:buFont typeface="Calibri" panose="020F0502020204030204" pitchFamily="34" charset="0"/>
+              <a:buChar char="−"/>
+            </a:pPr>
+            <a:r>
+              <a:rPr lang="en-US" sz="1800" dirty="0"/>
+              <a:t>Upstream RNA Binding Protein</a:t>
+            </a:r>
+          </a:p>
+          <a:p>
+            <a:r>
+              <a:rPr lang="en-US" sz="1800" dirty="0"/>
+              <a:t>For cluster 1:</a:t>
+            </a:r>
+          </a:p>
+          <a:p>
+            <a:pPr lvl="1">
+              <a:buFont typeface="Calibri" panose="020F0502020204030204" pitchFamily="34" charset="0"/>
+              <a:buChar char="−"/>
+            </a:pPr>
+            <a:r>
+              <a:rPr lang="en-US" sz="1800" dirty="0"/>
+              <a:t>SRSF2 expression co-clustered within SRSF2-regulated cluster 1 - strongly implies expression-regulated splicing</a:t>
+            </a:r>
+          </a:p>
+          <a:p>
+            <a:pPr lvl="1">
+              <a:buFont typeface="Calibri" panose="020F0502020204030204" pitchFamily="34" charset="0"/>
+              <a:buChar char="−"/>
+            </a:pPr>
+            <a:r>
+              <a:rPr lang="en-US" sz="1800" dirty="0"/>
+              <a:t>SRRM2 is a target of MBNL1 and SRSF2</a:t>
+            </a:r>
+          </a:p>
+          <a:p>
+            <a:pPr lvl="1">
+              <a:buFont typeface="Calibri" panose="020F0502020204030204" pitchFamily="34" charset="0"/>
+              <a:buChar char="−"/>
+            </a:pPr>
+            <a:r>
+              <a:rPr lang="en-US" sz="1800" dirty="0"/>
+              <a:t>MBNL1/2 seem important</a:t>
+            </a:r>
+          </a:p>
+          <a:p>
+            <a:pPr lvl="1">
+              <a:buFont typeface="Calibri" panose="020F0502020204030204" pitchFamily="34" charset="0"/>
+              <a:buChar char="−"/>
+            </a:pPr>
+            <a:r>
+              <a:rPr lang="en-US" sz="1800" dirty="0"/>
+              <a:t>Multiple other SFs/spliceosome machinery have similar expression</a:t>
+            </a:r>
+          </a:p>
+          <a:p>
+            <a:r>
+              <a:rPr lang="en-US" sz="1800" dirty="0"/>
+              <a:t>Additionally:</a:t>
+            </a:r>
+          </a:p>
+          <a:p>
+            <a:pPr lvl="1">
+              <a:buFont typeface="Calibri" panose="020F0502020204030204" pitchFamily="34" charset="0"/>
+              <a:buChar char="−"/>
+            </a:pPr>
+            <a:r>
+              <a:rPr lang="en-US" sz="1800" dirty="0"/>
+              <a:t>DNMT1 (5-mC), EZH2 (H3K27me3) expression co-clustering suggests upstream transcriptional regulation</a:t>
+            </a:r>
+          </a:p>
+          <a:p>
+            <a:pPr lvl="1">
+              <a:buFont typeface="Calibri" panose="020F0502020204030204" pitchFamily="34" charset="0"/>
+              <a:buChar char="−"/>
+            </a:pPr>
+            <a:r>
+              <a:rPr lang="en-US" sz="1800" dirty="0"/>
+              <a:t>CDK2, E2F2 suggests relation to cell-cycle</a:t>
+            </a:r>
+          </a:p>
+          <a:p>
+            <a:pPr lvl="1">
+              <a:buFont typeface="Calibri" panose="020F0502020204030204" pitchFamily="34" charset="0"/>
+              <a:buChar char="−"/>
+            </a:pPr>
+            <a:r>
+              <a:rPr lang="en-US" sz="1800" dirty="0"/>
+              <a:t>However, TLE family is involved in repression of </a:t>
+            </a:r>
+            <a:r>
+              <a:rPr lang="en-US" sz="1800" dirty="0" err="1"/>
+              <a:t>Wnt</a:t>
+            </a:r>
+            <a:r>
+              <a:rPr lang="en-US" sz="1800" dirty="0"/>
+              <a:t> </a:t>
+            </a:r>
+            <a:r>
+              <a:rPr lang="en-US" sz="1800" dirty="0" err="1"/>
+              <a:t>signalling</a:t>
+            </a:r>
+            <a:endParaRPr lang="en-US" sz="1800" dirty="0"/>
+          </a:p>
+        </p:txBody>
+      </p:sp>
+      <p:sp>
+        <p:nvSpPr>
+          <p:cNvPr id="12" name="Content Placeholder 2">
+            <a:extLst>
+              <a:ext uri="{FF2B5EF4-FFF2-40B4-BE49-F238E27FC236}">
+                <a16:creationId xmlns:a16="http://schemas.microsoft.com/office/drawing/2014/main" id="{4B1DFC46-4553-460F-B338-4E6670460D23}"/>
+              </a:ext>
+            </a:extLst>
+          </p:cNvPr>
+          <p:cNvSpPr txBox="1">
+            <a:spLocks/>
+          </p:cNvSpPr>
+          <p:nvPr/>
+        </p:nvSpPr>
+        <p:spPr>
+          <a:xfrm>
+            <a:off x="6606959" y="2437296"/>
+            <a:ext cx="1352286" cy="336521"/>
+          </a:xfrm>
+          <a:prstGeom prst="rect">
+            <a:avLst/>
+          </a:prstGeom>
+        </p:spPr>
+        <p:txBody>
+          <a:bodyPr vert="horz" lIns="91440" tIns="45720" rIns="91440" bIns="45720" rtlCol="0">
+            <a:normAutofit/>
+          </a:bodyPr>
+          <a:lstStyle>
+            <a:lvl1pPr marL="228600" indent="-228600" algn="l" defTabSz="914400" rtl="0" eaLnBrk="1" latinLnBrk="0" hangingPunct="1">
+              <a:lnSpc>
+                <a:spcPct val="90000"/>
+              </a:lnSpc>
+              <a:spcBef>
+                <a:spcPts val="1000"/>
+              </a:spcBef>
+              <a:buFont typeface="Arial" panose="020B0604020202020204" pitchFamily="34" charset="0"/>
+              <a:buChar char="•"/>
+              <a:defRPr sz="2800" kern="1200">
+                <a:solidFill>
+                  <a:schemeClr val="tx1"/>
+                </a:solidFill>
+                <a:latin typeface="+mn-lt"/>
+                <a:ea typeface="+mn-ea"/>
+                <a:cs typeface="+mn-cs"/>
+              </a:defRPr>
+            </a:lvl1pPr>
+            <a:lvl2pPr marL="685800" indent="-228600" algn="l" defTabSz="914400" rtl="0" eaLnBrk="1" latinLnBrk="0" hangingPunct="1">
+              <a:lnSpc>
+                <a:spcPct val="90000"/>
+              </a:lnSpc>
+              <a:spcBef>
+                <a:spcPts val="500"/>
+              </a:spcBef>
+              <a:buFont typeface="Arial" panose="020B0604020202020204" pitchFamily="34" charset="0"/>
+              <a:buChar char="•"/>
+              <a:defRPr sz="2400" kern="1200">
+                <a:solidFill>
+                  <a:schemeClr val="tx1"/>
+                </a:solidFill>
+                <a:latin typeface="+mn-lt"/>
+                <a:ea typeface="+mn-ea"/>
+                <a:cs typeface="+mn-cs"/>
+              </a:defRPr>
+            </a:lvl2pPr>
+            <a:lvl3pPr marL="1143000" indent="-228600" algn="l" defTabSz="914400" rtl="0" eaLnBrk="1" latinLnBrk="0" hangingPunct="1">
+              <a:lnSpc>
+                <a:spcPct val="90000"/>
+              </a:lnSpc>
+              <a:spcBef>
+                <a:spcPts val="500"/>
+              </a:spcBef>
+              <a:buFont typeface="Arial" panose="020B0604020202020204" pitchFamily="34" charset="0"/>
+              <a:buChar char="•"/>
+              <a:defRPr sz="2000" kern="1200">
+                <a:solidFill>
+                  <a:schemeClr val="tx1"/>
+                </a:solidFill>
+                <a:latin typeface="+mn-lt"/>
+                <a:ea typeface="+mn-ea"/>
+                <a:cs typeface="+mn-cs"/>
+              </a:defRPr>
+            </a:lvl3pPr>
+            <a:lvl4pPr marL="1600200" indent="-228600" algn="l" defTabSz="914400" rtl="0" eaLnBrk="1" latinLnBrk="0" hangingPunct="1">
+              <a:lnSpc>
+                <a:spcPct val="90000"/>
+              </a:lnSpc>
+              <a:spcBef>
+                <a:spcPts val="500"/>
+              </a:spcBef>
+              <a:buFont typeface="Arial" panose="020B0604020202020204" pitchFamily="34" charset="0"/>
+              <a:buChar char="•"/>
+              <a:defRPr sz="1800" kern="1200">
+                <a:solidFill>
+                  <a:schemeClr val="tx1"/>
+                </a:solidFill>
+                <a:latin typeface="+mn-lt"/>
+                <a:ea typeface="+mn-ea"/>
+                <a:cs typeface="+mn-cs"/>
+              </a:defRPr>
+            </a:lvl4pPr>
+            <a:lvl5pPr marL="2057400" indent="-228600" algn="l" defTabSz="914400" rtl="0" eaLnBrk="1" latinLnBrk="0" hangingPunct="1">
+              <a:lnSpc>
+                <a:spcPct val="90000"/>
+              </a:lnSpc>
+              <a:spcBef>
+                <a:spcPts val="500"/>
+              </a:spcBef>
+              <a:buFont typeface="Arial" panose="020B0604020202020204" pitchFamily="34" charset="0"/>
+              <a:buChar char="•"/>
+              <a:defRPr sz="1800" kern="1200">
+                <a:solidFill>
+                  <a:schemeClr val="tx1"/>
+                </a:solidFill>
+                <a:latin typeface="+mn-lt"/>
+                <a:ea typeface="+mn-ea"/>
+                <a:cs typeface="+mn-cs"/>
+              </a:defRPr>
+            </a:lvl5pPr>
+            <a:lvl6pPr marL="2514600" indent="-228600" algn="l" defTabSz="914400" rtl="0" eaLnBrk="1" latinLnBrk="0" hangingPunct="1">
+              <a:lnSpc>
+                <a:spcPct val="90000"/>
+              </a:lnSpc>
+              <a:spcBef>
+                <a:spcPts val="500"/>
+              </a:spcBef>
+              <a:buFont typeface="Arial" panose="020B0604020202020204" pitchFamily="34" charset="0"/>
+              <a:buChar char="•"/>
+              <a:defRPr sz="1800" kern="1200">
+                <a:solidFill>
+                  <a:schemeClr val="tx1"/>
+                </a:solidFill>
+                <a:latin typeface="+mn-lt"/>
+                <a:ea typeface="+mn-ea"/>
+                <a:cs typeface="+mn-cs"/>
+              </a:defRPr>
+            </a:lvl6pPr>
+            <a:lvl7pPr marL="2971800" indent="-228600" algn="l" defTabSz="914400" rtl="0" eaLnBrk="1" latinLnBrk="0" hangingPunct="1">
+              <a:lnSpc>
+                <a:spcPct val="90000"/>
+              </a:lnSpc>
+              <a:spcBef>
+                <a:spcPts val="500"/>
+              </a:spcBef>
+              <a:buFont typeface="Arial" panose="020B0604020202020204" pitchFamily="34" charset="0"/>
+              <a:buChar char="•"/>
+              <a:defRPr sz="1800" kern="1200">
+                <a:solidFill>
+                  <a:schemeClr val="tx1"/>
+                </a:solidFill>
+                <a:latin typeface="+mn-lt"/>
+                <a:ea typeface="+mn-ea"/>
+                <a:cs typeface="+mn-cs"/>
+              </a:defRPr>
+            </a:lvl7pPr>
+            <a:lvl8pPr marL="3429000" indent="-228600" algn="l" defTabSz="914400" rtl="0" eaLnBrk="1" latinLnBrk="0" hangingPunct="1">
+              <a:lnSpc>
+                <a:spcPct val="90000"/>
+              </a:lnSpc>
+              <a:spcBef>
+                <a:spcPts val="500"/>
+              </a:spcBef>
+              <a:buFont typeface="Arial" panose="020B0604020202020204" pitchFamily="34" charset="0"/>
+              <a:buChar char="•"/>
+              <a:defRPr sz="1800" kern="1200">
+                <a:solidFill>
+                  <a:schemeClr val="tx1"/>
+                </a:solidFill>
+                <a:latin typeface="+mn-lt"/>
+                <a:ea typeface="+mn-ea"/>
+                <a:cs typeface="+mn-cs"/>
+              </a:defRPr>
+            </a:lvl8pPr>
+            <a:lvl9pPr marL="3886200" indent="-228600" algn="l" defTabSz="914400" rtl="0" eaLnBrk="1" latinLnBrk="0" hangingPunct="1">
+              <a:lnSpc>
+                <a:spcPct val="90000"/>
+              </a:lnSpc>
+              <a:spcBef>
+                <a:spcPts val="500"/>
+              </a:spcBef>
+              <a:buFont typeface="Arial" panose="020B0604020202020204" pitchFamily="34" charset="0"/>
+              <a:buChar char="•"/>
+              <a:defRPr sz="1800" kern="1200">
+                <a:solidFill>
+                  <a:schemeClr val="tx1"/>
+                </a:solidFill>
+                <a:latin typeface="+mn-lt"/>
+                <a:ea typeface="+mn-ea"/>
+                <a:cs typeface="+mn-cs"/>
+              </a:defRPr>
+            </a:lvl9pPr>
+          </a:lstStyle>
+          <a:p>
+            <a:pPr marL="0" indent="0">
+              <a:buNone/>
+            </a:pPr>
+            <a:r>
+              <a:rPr lang="en-US" sz="1200" dirty="0">
+                <a:solidFill>
+                  <a:srgbClr val="00B0F0"/>
+                </a:solidFill>
+              </a:rPr>
+              <a:t>CDK2, E2F2, TLE4</a:t>
+            </a:r>
+          </a:p>
+        </p:txBody>
+      </p:sp>
+      <p:sp>
+        <p:nvSpPr>
+          <p:cNvPr id="23" name="Content Placeholder 2">
+            <a:extLst>
+              <a:ext uri="{FF2B5EF4-FFF2-40B4-BE49-F238E27FC236}">
+                <a16:creationId xmlns:a16="http://schemas.microsoft.com/office/drawing/2014/main" id="{B625E271-2718-4513-A1A9-78EEA1C8E4E9}"/>
+              </a:ext>
+            </a:extLst>
+          </p:cNvPr>
+          <p:cNvSpPr txBox="1">
+            <a:spLocks/>
+          </p:cNvSpPr>
+          <p:nvPr/>
+        </p:nvSpPr>
+        <p:spPr>
+          <a:xfrm>
+            <a:off x="6606959" y="2649148"/>
+            <a:ext cx="1352286" cy="395576"/>
+          </a:xfrm>
+          <a:prstGeom prst="rect">
+            <a:avLst/>
+          </a:prstGeom>
+        </p:spPr>
+        <p:txBody>
+          <a:bodyPr vert="horz" lIns="91440" tIns="45720" rIns="91440" bIns="45720" rtlCol="0">
+            <a:normAutofit lnSpcReduction="10000"/>
+          </a:bodyPr>
+          <a:lstStyle>
+            <a:lvl1pPr marL="228600" indent="-228600" algn="l" defTabSz="914400" rtl="0" eaLnBrk="1" latinLnBrk="0" hangingPunct="1">
+              <a:lnSpc>
+                <a:spcPct val="90000"/>
+              </a:lnSpc>
+              <a:spcBef>
+                <a:spcPts val="1000"/>
+              </a:spcBef>
+              <a:buFont typeface="Arial" panose="020B0604020202020204" pitchFamily="34" charset="0"/>
+              <a:buChar char="•"/>
+              <a:defRPr sz="2800" kern="1200">
+                <a:solidFill>
+                  <a:schemeClr val="tx1"/>
+                </a:solidFill>
+                <a:latin typeface="+mn-lt"/>
+                <a:ea typeface="+mn-ea"/>
+                <a:cs typeface="+mn-cs"/>
+              </a:defRPr>
+            </a:lvl1pPr>
+            <a:lvl2pPr marL="685800" indent="-228600" algn="l" defTabSz="914400" rtl="0" eaLnBrk="1" latinLnBrk="0" hangingPunct="1">
+              <a:lnSpc>
+                <a:spcPct val="90000"/>
+              </a:lnSpc>
+              <a:spcBef>
+                <a:spcPts val="500"/>
+              </a:spcBef>
+              <a:buFont typeface="Arial" panose="020B0604020202020204" pitchFamily="34" charset="0"/>
+              <a:buChar char="•"/>
+              <a:defRPr sz="2400" kern="1200">
+                <a:solidFill>
+                  <a:schemeClr val="tx1"/>
+                </a:solidFill>
+                <a:latin typeface="+mn-lt"/>
+                <a:ea typeface="+mn-ea"/>
+                <a:cs typeface="+mn-cs"/>
+              </a:defRPr>
+            </a:lvl2pPr>
+            <a:lvl3pPr marL="1143000" indent="-228600" algn="l" defTabSz="914400" rtl="0" eaLnBrk="1" latinLnBrk="0" hangingPunct="1">
+              <a:lnSpc>
+                <a:spcPct val="90000"/>
+              </a:lnSpc>
+              <a:spcBef>
+                <a:spcPts val="500"/>
+              </a:spcBef>
+              <a:buFont typeface="Arial" panose="020B0604020202020204" pitchFamily="34" charset="0"/>
+              <a:buChar char="•"/>
+              <a:defRPr sz="2000" kern="1200">
+                <a:solidFill>
+                  <a:schemeClr val="tx1"/>
+                </a:solidFill>
+                <a:latin typeface="+mn-lt"/>
+                <a:ea typeface="+mn-ea"/>
+                <a:cs typeface="+mn-cs"/>
+              </a:defRPr>
+            </a:lvl3pPr>
+            <a:lvl4pPr marL="1600200" indent="-228600" algn="l" defTabSz="914400" rtl="0" eaLnBrk="1" latinLnBrk="0" hangingPunct="1">
+              <a:lnSpc>
+                <a:spcPct val="90000"/>
+              </a:lnSpc>
+              <a:spcBef>
+                <a:spcPts val="500"/>
+              </a:spcBef>
+              <a:buFont typeface="Arial" panose="020B0604020202020204" pitchFamily="34" charset="0"/>
+              <a:buChar char="•"/>
+              <a:defRPr sz="1800" kern="1200">
+                <a:solidFill>
+                  <a:schemeClr val="tx1"/>
+                </a:solidFill>
+                <a:latin typeface="+mn-lt"/>
+                <a:ea typeface="+mn-ea"/>
+                <a:cs typeface="+mn-cs"/>
+              </a:defRPr>
+            </a:lvl4pPr>
+            <a:lvl5pPr marL="2057400" indent="-228600" algn="l" defTabSz="914400" rtl="0" eaLnBrk="1" latinLnBrk="0" hangingPunct="1">
+              <a:lnSpc>
+                <a:spcPct val="90000"/>
+              </a:lnSpc>
+              <a:spcBef>
+                <a:spcPts val="500"/>
+              </a:spcBef>
+              <a:buFont typeface="Arial" panose="020B0604020202020204" pitchFamily="34" charset="0"/>
+              <a:buChar char="•"/>
+              <a:defRPr sz="1800" kern="1200">
+                <a:solidFill>
+                  <a:schemeClr val="tx1"/>
+                </a:solidFill>
+                <a:latin typeface="+mn-lt"/>
+                <a:ea typeface="+mn-ea"/>
+                <a:cs typeface="+mn-cs"/>
+              </a:defRPr>
+            </a:lvl5pPr>
+            <a:lvl6pPr marL="2514600" indent="-228600" algn="l" defTabSz="914400" rtl="0" eaLnBrk="1" latinLnBrk="0" hangingPunct="1">
+              <a:lnSpc>
+                <a:spcPct val="90000"/>
+              </a:lnSpc>
+              <a:spcBef>
+                <a:spcPts val="500"/>
+              </a:spcBef>
+              <a:buFont typeface="Arial" panose="020B0604020202020204" pitchFamily="34" charset="0"/>
+              <a:buChar char="•"/>
+              <a:defRPr sz="1800" kern="1200">
+                <a:solidFill>
+                  <a:schemeClr val="tx1"/>
+                </a:solidFill>
+                <a:latin typeface="+mn-lt"/>
+                <a:ea typeface="+mn-ea"/>
+                <a:cs typeface="+mn-cs"/>
+              </a:defRPr>
+            </a:lvl6pPr>
+            <a:lvl7pPr marL="2971800" indent="-228600" algn="l" defTabSz="914400" rtl="0" eaLnBrk="1" latinLnBrk="0" hangingPunct="1">
+              <a:lnSpc>
+                <a:spcPct val="90000"/>
+              </a:lnSpc>
+              <a:spcBef>
+                <a:spcPts val="500"/>
+              </a:spcBef>
+              <a:buFont typeface="Arial" panose="020B0604020202020204" pitchFamily="34" charset="0"/>
+              <a:buChar char="•"/>
+              <a:defRPr sz="1800" kern="1200">
+                <a:solidFill>
+                  <a:schemeClr val="tx1"/>
+                </a:solidFill>
+                <a:latin typeface="+mn-lt"/>
+                <a:ea typeface="+mn-ea"/>
+                <a:cs typeface="+mn-cs"/>
+              </a:defRPr>
+            </a:lvl7pPr>
+            <a:lvl8pPr marL="3429000" indent="-228600" algn="l" defTabSz="914400" rtl="0" eaLnBrk="1" latinLnBrk="0" hangingPunct="1">
+              <a:lnSpc>
+                <a:spcPct val="90000"/>
+              </a:lnSpc>
+              <a:spcBef>
+                <a:spcPts val="500"/>
+              </a:spcBef>
+              <a:buFont typeface="Arial" panose="020B0604020202020204" pitchFamily="34" charset="0"/>
+              <a:buChar char="•"/>
+              <a:defRPr sz="1800" kern="1200">
+                <a:solidFill>
+                  <a:schemeClr val="tx1"/>
+                </a:solidFill>
+                <a:latin typeface="+mn-lt"/>
+                <a:ea typeface="+mn-ea"/>
+                <a:cs typeface="+mn-cs"/>
+              </a:defRPr>
+            </a:lvl8pPr>
+            <a:lvl9pPr marL="3886200" indent="-228600" algn="l" defTabSz="914400" rtl="0" eaLnBrk="1" latinLnBrk="0" hangingPunct="1">
+              <a:lnSpc>
+                <a:spcPct val="90000"/>
+              </a:lnSpc>
+              <a:spcBef>
+                <a:spcPts val="500"/>
+              </a:spcBef>
+              <a:buFont typeface="Arial" panose="020B0604020202020204" pitchFamily="34" charset="0"/>
+              <a:buChar char="•"/>
+              <a:defRPr sz="1800" kern="1200">
+                <a:solidFill>
+                  <a:schemeClr val="tx1"/>
+                </a:solidFill>
+                <a:latin typeface="+mn-lt"/>
+                <a:ea typeface="+mn-ea"/>
+                <a:cs typeface="+mn-cs"/>
+              </a:defRPr>
+            </a:lvl9pPr>
+          </a:lstStyle>
+          <a:p>
+            <a:pPr marL="0" indent="0">
+              <a:buNone/>
+            </a:pPr>
+            <a:r>
+              <a:rPr lang="en-US" sz="800" b="1" dirty="0">
+                <a:solidFill>
+                  <a:srgbClr val="FE76BD"/>
+                </a:solidFill>
+              </a:rPr>
+              <a:t>HNRNPA1</a:t>
+            </a:r>
+            <a:r>
+              <a:rPr lang="en-US" sz="800" dirty="0">
+                <a:solidFill>
+                  <a:srgbClr val="FE76BD"/>
+                </a:solidFill>
+              </a:rPr>
+              <a:t>, </a:t>
+            </a:r>
+            <a:r>
+              <a:rPr lang="en-US" sz="800" b="1" dirty="0">
+                <a:solidFill>
+                  <a:srgbClr val="FE76BD"/>
+                </a:solidFill>
+              </a:rPr>
+              <a:t>SFPQ, SNRP(A1/25), SRSF2, </a:t>
+            </a:r>
+            <a:r>
+              <a:rPr lang="en-US" sz="800" dirty="0">
+                <a:solidFill>
+                  <a:srgbClr val="FE76BD"/>
+                </a:solidFill>
+              </a:rPr>
+              <a:t>DNMT1, EZH2</a:t>
+            </a:r>
+            <a:endParaRPr lang="en-US" sz="800" b="1" dirty="0">
+              <a:solidFill>
+                <a:srgbClr val="FE76BD"/>
+              </a:solidFill>
+            </a:endParaRPr>
+          </a:p>
+        </p:txBody>
+      </p:sp>
+      <p:sp>
+        <p:nvSpPr>
+          <p:cNvPr id="24" name="Content Placeholder 2">
+            <a:extLst>
+              <a:ext uri="{FF2B5EF4-FFF2-40B4-BE49-F238E27FC236}">
+                <a16:creationId xmlns:a16="http://schemas.microsoft.com/office/drawing/2014/main" id="{A39BC1C9-090C-4B24-83BE-F551131830CB}"/>
+              </a:ext>
+            </a:extLst>
+          </p:cNvPr>
+          <p:cNvSpPr txBox="1">
+            <a:spLocks/>
+          </p:cNvSpPr>
+          <p:nvPr/>
+        </p:nvSpPr>
+        <p:spPr>
+          <a:xfrm>
+            <a:off x="7805407" y="2386722"/>
+            <a:ext cx="1352286" cy="604788"/>
+          </a:xfrm>
+          <a:prstGeom prst="rect">
+            <a:avLst/>
+          </a:prstGeom>
+        </p:spPr>
+        <p:txBody>
+          <a:bodyPr vert="horz" lIns="91440" tIns="45720" rIns="91440" bIns="45720" rtlCol="0">
+            <a:noAutofit/>
+          </a:bodyPr>
+          <a:lstStyle>
+            <a:lvl1pPr marL="228600" indent="-228600" algn="l" defTabSz="914400" rtl="0" eaLnBrk="1" latinLnBrk="0" hangingPunct="1">
+              <a:lnSpc>
+                <a:spcPct val="90000"/>
+              </a:lnSpc>
+              <a:spcBef>
+                <a:spcPts val="1000"/>
+              </a:spcBef>
+              <a:buFont typeface="Arial" panose="020B0604020202020204" pitchFamily="34" charset="0"/>
+              <a:buChar char="•"/>
+              <a:defRPr sz="2800" kern="1200">
+                <a:solidFill>
+                  <a:schemeClr val="tx1"/>
+                </a:solidFill>
+                <a:latin typeface="+mn-lt"/>
+                <a:ea typeface="+mn-ea"/>
+                <a:cs typeface="+mn-cs"/>
+              </a:defRPr>
+            </a:lvl1pPr>
+            <a:lvl2pPr marL="685800" indent="-228600" algn="l" defTabSz="914400" rtl="0" eaLnBrk="1" latinLnBrk="0" hangingPunct="1">
+              <a:lnSpc>
+                <a:spcPct val="90000"/>
+              </a:lnSpc>
+              <a:spcBef>
+                <a:spcPts val="500"/>
+              </a:spcBef>
+              <a:buFont typeface="Arial" panose="020B0604020202020204" pitchFamily="34" charset="0"/>
+              <a:buChar char="•"/>
+              <a:defRPr sz="2400" kern="1200">
+                <a:solidFill>
+                  <a:schemeClr val="tx1"/>
+                </a:solidFill>
+                <a:latin typeface="+mn-lt"/>
+                <a:ea typeface="+mn-ea"/>
+                <a:cs typeface="+mn-cs"/>
+              </a:defRPr>
+            </a:lvl2pPr>
+            <a:lvl3pPr marL="1143000" indent="-228600" algn="l" defTabSz="914400" rtl="0" eaLnBrk="1" latinLnBrk="0" hangingPunct="1">
+              <a:lnSpc>
+                <a:spcPct val="90000"/>
+              </a:lnSpc>
+              <a:spcBef>
+                <a:spcPts val="500"/>
+              </a:spcBef>
+              <a:buFont typeface="Arial" panose="020B0604020202020204" pitchFamily="34" charset="0"/>
+              <a:buChar char="•"/>
+              <a:defRPr sz="2000" kern="1200">
+                <a:solidFill>
+                  <a:schemeClr val="tx1"/>
+                </a:solidFill>
+                <a:latin typeface="+mn-lt"/>
+                <a:ea typeface="+mn-ea"/>
+                <a:cs typeface="+mn-cs"/>
+              </a:defRPr>
+            </a:lvl3pPr>
+            <a:lvl4pPr marL="1600200" indent="-228600" algn="l" defTabSz="914400" rtl="0" eaLnBrk="1" latinLnBrk="0" hangingPunct="1">
+              <a:lnSpc>
+                <a:spcPct val="90000"/>
+              </a:lnSpc>
+              <a:spcBef>
+                <a:spcPts val="500"/>
+              </a:spcBef>
+              <a:buFont typeface="Arial" panose="020B0604020202020204" pitchFamily="34" charset="0"/>
+              <a:buChar char="•"/>
+              <a:defRPr sz="1800" kern="1200">
+                <a:solidFill>
+                  <a:schemeClr val="tx1"/>
+                </a:solidFill>
+                <a:latin typeface="+mn-lt"/>
+                <a:ea typeface="+mn-ea"/>
+                <a:cs typeface="+mn-cs"/>
+              </a:defRPr>
+            </a:lvl4pPr>
+            <a:lvl5pPr marL="2057400" indent="-228600" algn="l" defTabSz="914400" rtl="0" eaLnBrk="1" latinLnBrk="0" hangingPunct="1">
+              <a:lnSpc>
+                <a:spcPct val="90000"/>
+              </a:lnSpc>
+              <a:spcBef>
+                <a:spcPts val="500"/>
+              </a:spcBef>
+              <a:buFont typeface="Arial" panose="020B0604020202020204" pitchFamily="34" charset="0"/>
+              <a:buChar char="•"/>
+              <a:defRPr sz="1800" kern="1200">
+                <a:solidFill>
+                  <a:schemeClr val="tx1"/>
+                </a:solidFill>
+                <a:latin typeface="+mn-lt"/>
+                <a:ea typeface="+mn-ea"/>
+                <a:cs typeface="+mn-cs"/>
+              </a:defRPr>
+            </a:lvl5pPr>
+            <a:lvl6pPr marL="2514600" indent="-228600" algn="l" defTabSz="914400" rtl="0" eaLnBrk="1" latinLnBrk="0" hangingPunct="1">
+              <a:lnSpc>
+                <a:spcPct val="90000"/>
+              </a:lnSpc>
+              <a:spcBef>
+                <a:spcPts val="500"/>
+              </a:spcBef>
+              <a:buFont typeface="Arial" panose="020B0604020202020204" pitchFamily="34" charset="0"/>
+              <a:buChar char="•"/>
+              <a:defRPr sz="1800" kern="1200">
+                <a:solidFill>
+                  <a:schemeClr val="tx1"/>
+                </a:solidFill>
+                <a:latin typeface="+mn-lt"/>
+                <a:ea typeface="+mn-ea"/>
+                <a:cs typeface="+mn-cs"/>
+              </a:defRPr>
+            </a:lvl6pPr>
+            <a:lvl7pPr marL="2971800" indent="-228600" algn="l" defTabSz="914400" rtl="0" eaLnBrk="1" latinLnBrk="0" hangingPunct="1">
+              <a:lnSpc>
+                <a:spcPct val="90000"/>
+              </a:lnSpc>
+              <a:spcBef>
+                <a:spcPts val="500"/>
+              </a:spcBef>
+              <a:buFont typeface="Arial" panose="020B0604020202020204" pitchFamily="34" charset="0"/>
+              <a:buChar char="•"/>
+              <a:defRPr sz="1800" kern="1200">
+                <a:solidFill>
+                  <a:schemeClr val="tx1"/>
+                </a:solidFill>
+                <a:latin typeface="+mn-lt"/>
+                <a:ea typeface="+mn-ea"/>
+                <a:cs typeface="+mn-cs"/>
+              </a:defRPr>
+            </a:lvl7pPr>
+            <a:lvl8pPr marL="3429000" indent="-228600" algn="l" defTabSz="914400" rtl="0" eaLnBrk="1" latinLnBrk="0" hangingPunct="1">
+              <a:lnSpc>
+                <a:spcPct val="90000"/>
+              </a:lnSpc>
+              <a:spcBef>
+                <a:spcPts val="500"/>
+              </a:spcBef>
+              <a:buFont typeface="Arial" panose="020B0604020202020204" pitchFamily="34" charset="0"/>
+              <a:buChar char="•"/>
+              <a:defRPr sz="1800" kern="1200">
+                <a:solidFill>
+                  <a:schemeClr val="tx1"/>
+                </a:solidFill>
+                <a:latin typeface="+mn-lt"/>
+                <a:ea typeface="+mn-ea"/>
+                <a:cs typeface="+mn-cs"/>
+              </a:defRPr>
+            </a:lvl8pPr>
+            <a:lvl9pPr marL="3886200" indent="-228600" algn="l" defTabSz="914400" rtl="0" eaLnBrk="1" latinLnBrk="0" hangingPunct="1">
+              <a:lnSpc>
+                <a:spcPct val="90000"/>
+              </a:lnSpc>
+              <a:spcBef>
+                <a:spcPts val="500"/>
+              </a:spcBef>
+              <a:buFont typeface="Arial" panose="020B0604020202020204" pitchFamily="34" charset="0"/>
+              <a:buChar char="•"/>
+              <a:defRPr sz="1800" kern="1200">
+                <a:solidFill>
+                  <a:schemeClr val="tx1"/>
+                </a:solidFill>
+                <a:latin typeface="+mn-lt"/>
+                <a:ea typeface="+mn-ea"/>
+                <a:cs typeface="+mn-cs"/>
+              </a:defRPr>
+            </a:lvl9pPr>
+          </a:lstStyle>
+          <a:p>
+            <a:pPr marL="0" indent="0">
+              <a:buNone/>
+            </a:pPr>
+            <a:r>
+              <a:rPr lang="en-US" sz="900" b="1" dirty="0">
+                <a:solidFill>
+                  <a:srgbClr val="7030A0"/>
+                </a:solidFill>
+              </a:rPr>
+              <a:t>HNRNPA2B1</a:t>
+            </a:r>
+            <a:r>
+              <a:rPr lang="en-US" sz="900" dirty="0">
+                <a:solidFill>
+                  <a:srgbClr val="7030A0"/>
+                </a:solidFill>
+              </a:rPr>
+              <a:t>, </a:t>
+            </a:r>
+            <a:r>
+              <a:rPr lang="en-US" sz="900" b="1" dirty="0">
+                <a:solidFill>
+                  <a:srgbClr val="7030A0"/>
+                </a:solidFill>
+              </a:rPr>
+              <a:t>MBNL1</a:t>
+            </a:r>
+            <a:r>
+              <a:rPr lang="en-US" sz="900" dirty="0">
+                <a:solidFill>
+                  <a:srgbClr val="7030A0"/>
+                </a:solidFill>
+              </a:rPr>
+              <a:t>,</a:t>
+            </a:r>
+            <a:r>
+              <a:rPr lang="en-US" sz="900" b="1" dirty="0">
+                <a:solidFill>
+                  <a:srgbClr val="7030A0"/>
+                </a:solidFill>
+              </a:rPr>
+              <a:t> SNRNP(70/A1)</a:t>
+            </a:r>
+            <a:r>
+              <a:rPr lang="en-US" sz="900" dirty="0">
+                <a:solidFill>
+                  <a:srgbClr val="7030A0"/>
+                </a:solidFill>
+              </a:rPr>
+              <a:t>, </a:t>
+            </a:r>
+            <a:r>
+              <a:rPr lang="en-US" sz="900" b="1" dirty="0">
+                <a:solidFill>
+                  <a:srgbClr val="7030A0"/>
+                </a:solidFill>
+              </a:rPr>
+              <a:t>SRRM2, </a:t>
+            </a:r>
+            <a:r>
+              <a:rPr lang="en-US" sz="900" dirty="0">
+                <a:solidFill>
+                  <a:srgbClr val="7030A0"/>
+                </a:solidFill>
+              </a:rPr>
+              <a:t>ATXN2L, FBXL19, FBXO5, KDM4A, NCOR2, POLD4, </a:t>
+            </a:r>
+            <a:endParaRPr lang="en-US" sz="900" b="1" dirty="0">
+              <a:solidFill>
+                <a:srgbClr val="7030A0"/>
+              </a:solidFill>
+            </a:endParaRPr>
+          </a:p>
+        </p:txBody>
+      </p:sp>
+    </p:spTree>
+    <p:extLst>
+      <p:ext uri="{BB962C8B-B14F-4D97-AF65-F5344CB8AC3E}">
+        <p14:creationId xmlns:p14="http://schemas.microsoft.com/office/powerpoint/2010/main" val="1237524943"/>
+      </p:ext>
+    </p:extLst>
+  </p:cSld>
+  <p:clrMapOvr>
+    <a:masterClrMapping/>
+  </p:clrMapOvr>
+</p:sld>
+</file>
+
+<file path=ppt/slides/slide9.xml><?xml version="1.0" encoding="utf-8"?>
+<p:sld xmlns:a="http://schemas.openxmlformats.org/drawingml/2006/main" xmlns:r="http://schemas.openxmlformats.org/officeDocument/2006/relationships" xmlns:p="http://schemas.openxmlformats.org/presentationml/2006/main">
+  <p:cSld>
+    <p:spTree>
+      <p:nvGrpSpPr>
+        <p:cNvPr id="1" name=""/>
+        <p:cNvGrpSpPr/>
+        <p:nvPr/>
+      </p:nvGrpSpPr>
+      <p:grpSpPr>
+        <a:xfrm>
+          <a:off x="0" y="0"/>
+          <a:ext cx="0" cy="0"/>
+          <a:chOff x="0" y="0"/>
+          <a:chExt cx="0" cy="0"/>
+        </a:xfrm>
+      </p:grpSpPr>
+      <p:pic>
+        <p:nvPicPr>
           <p:cNvPr id="14" name="Picture 13">
             <a:extLst>
               <a:ext uri="{FF2B5EF4-FFF2-40B4-BE49-F238E27FC236}">
@@ -7394,7 +8452,7 @@
             </a:pPr>
             <a:r>
               <a:rPr lang="en-US" sz="1800" dirty="0"/>
-              <a:t>SRRM2 is a target of SRSF2.</a:t>
+              <a:t>SRRM2 is a target of MBNL1 and SRSF2</a:t>
             </a:r>
           </a:p>
           <a:p>
@@ -8155,7 +9213,7 @@
         <p:spPr>
           <a:xfrm>
             <a:off x="6284614" y="4866259"/>
-            <a:ext cx="5383999" cy="1372565"/>
+            <a:ext cx="5383999" cy="1914551"/>
           </a:xfrm>
           <a:prstGeom prst="rect">
             <a:avLst/>
@@ -9734,7 +10792,7 @@
     </p:spTree>
     <p:extLst>
       <p:ext uri="{BB962C8B-B14F-4D97-AF65-F5344CB8AC3E}">
-        <p14:creationId xmlns:p14="http://schemas.microsoft.com/office/powerpoint/2010/main" val="1237524943"/>
+        <p14:creationId xmlns:p14="http://schemas.microsoft.com/office/powerpoint/2010/main" val="3064967776"/>
       </p:ext>
     </p:extLst>
   </p:cSld>

</xml_diff>